<commit_message>
Updated version of project plan presentation V1.0
</commit_message>
<xml_diff>
--- a/Project_Presentation.pptx
+++ b/Project_Presentation.pptx
@@ -13,7 +13,6 @@
     <p:sldId id="262" r:id="rId7"/>
     <p:sldId id="263" r:id="rId8"/>
     <p:sldId id="264" r:id="rId9"/>
-    <p:sldId id="265" r:id="rId10"/>
   </p:sldIdLst>
   <p:sldSz cx="12192000" cy="6858000"/>
   <p:notesSz cx="6858000" cy="9144000"/>
@@ -123,8 +122,8 @@
 <file path=ppt/revisionInfo.xml><?xml version="1.0" encoding="utf-8"?>
 <p1510:revInfo xmlns:a="http://schemas.openxmlformats.org/drawingml/2006/main" xmlns:r="http://schemas.openxmlformats.org/officeDocument/2006/relationships" xmlns:p1510="http://schemas.microsoft.com/office/powerpoint/2015/10/main">
   <p1510:revLst>
+    <p1510:client id="{E715300B-5F82-46A8-982F-D7099BC209F3}" v="44" dt="2018-03-12T20:36:34.329"/>
     <p1510:client id="{59774C1C-9BE2-43E0-A4B7-74DF345FC88F}" v="111" dt="2018-03-12T20:34:03.807"/>
-    <p1510:client id="{E715300B-5F82-46A8-982F-D7099BC209F3}" v="44" dt="2018-03-12T20:36:34.329"/>
   </p1510:revLst>
 </p1510:revInfo>
 </file>
@@ -842,7 +841,7 @@
             <a:fld id="{87DE6118-2437-4B30-8E3C-4D2BE6020583}" type="datetimeFigureOut">
               <a:rPr lang="en-US" dirty="0"/>
               <a:pPr/>
-              <a:t>3/15/18</a:t>
+              <a:t>3/18/18</a:t>
             </a:fld>
             <a:endParaRPr lang="en-US"/>
           </a:p>
@@ -1166,7 +1165,7 @@
           <a:p>
             <a:fld id="{87DE6118-2437-4B30-8E3C-4D2BE6020583}" type="datetimeFigureOut">
               <a:rPr lang="en-US" dirty="0"/>
-              <a:t>3/15/18</a:t>
+              <a:t>3/18/18</a:t>
             </a:fld>
             <a:endParaRPr lang="en-US"/>
           </a:p>
@@ -1339,7 +1338,7 @@
           <a:p>
             <a:fld id="{87DE6118-2437-4B30-8E3C-4D2BE6020583}" type="datetimeFigureOut">
               <a:rPr lang="en-US" dirty="0"/>
-              <a:t>3/15/18</a:t>
+              <a:t>3/18/18</a:t>
             </a:fld>
             <a:endParaRPr lang="en-US"/>
           </a:p>
@@ -1502,7 +1501,7 @@
           <a:p>
             <a:fld id="{87DE6118-2437-4B30-8E3C-4D2BE6020583}" type="datetimeFigureOut">
               <a:rPr lang="en-US" dirty="0"/>
-              <a:t>3/15/18</a:t>
+              <a:t>3/18/18</a:t>
             </a:fld>
             <a:endParaRPr lang="en-US"/>
           </a:p>
@@ -1774,7 +1773,7 @@
             <a:fld id="{87DE6118-2437-4B30-8E3C-4D2BE6020583}" type="datetimeFigureOut">
               <a:rPr lang="en-US" dirty="0"/>
               <a:pPr/>
-              <a:t>3/15/18</a:t>
+              <a:t>3/18/18</a:t>
             </a:fld>
             <a:endParaRPr lang="en-US"/>
           </a:p>
@@ -2161,7 +2160,7 @@
           <a:p>
             <a:fld id="{87DE6118-2437-4B30-8E3C-4D2BE6020583}" type="datetimeFigureOut">
               <a:rPr lang="en-US" dirty="0"/>
-              <a:t>3/15/18</a:t>
+              <a:t>3/18/18</a:t>
             </a:fld>
             <a:endParaRPr lang="en-US"/>
           </a:p>
@@ -2630,7 +2629,7 @@
           <a:p>
             <a:fld id="{87DE6118-2437-4B30-8E3C-4D2BE6020583}" type="datetimeFigureOut">
               <a:rPr lang="en-US" dirty="0"/>
-              <a:t>3/15/18</a:t>
+              <a:t>3/18/18</a:t>
             </a:fld>
             <a:endParaRPr lang="en-US"/>
           </a:p>
@@ -2742,7 +2741,7 @@
           <a:p>
             <a:fld id="{87DE6118-2437-4B30-8E3C-4D2BE6020583}" type="datetimeFigureOut">
               <a:rPr lang="en-US" dirty="0"/>
-              <a:t>3/15/18</a:t>
+              <a:t>3/18/18</a:t>
             </a:fld>
             <a:endParaRPr lang="en-US"/>
           </a:p>
@@ -2832,7 +2831,7 @@
           <a:p>
             <a:fld id="{87DE6118-2437-4B30-8E3C-4D2BE6020583}" type="datetimeFigureOut">
               <a:rPr lang="en-US" dirty="0"/>
-              <a:t>3/15/18</a:t>
+              <a:t>3/18/18</a:t>
             </a:fld>
             <a:endParaRPr lang="en-US"/>
           </a:p>
@@ -3172,7 +3171,7 @@
             <a:fld id="{87DE6118-2437-4B30-8E3C-4D2BE6020583}" type="datetimeFigureOut">
               <a:rPr lang="en-US" dirty="0"/>
               <a:pPr/>
-              <a:t>3/15/18</a:t>
+              <a:t>3/18/18</a:t>
             </a:fld>
             <a:endParaRPr lang="en-US"/>
           </a:p>
@@ -3555,7 +3554,7 @@
             <a:fld id="{87DE6118-2437-4B30-8E3C-4D2BE6020583}" type="datetimeFigureOut">
               <a:rPr lang="en-US" dirty="0"/>
               <a:pPr/>
-              <a:t>3/15/18</a:t>
+              <a:t>3/18/18</a:t>
             </a:fld>
             <a:endParaRPr lang="en-US"/>
           </a:p>
@@ -3828,7 +3827,7 @@
             <a:fld id="{87DE6118-2437-4B30-8E3C-4D2BE6020583}" type="datetimeFigureOut">
               <a:rPr lang="en-US" dirty="0"/>
               <a:pPr/>
-              <a:t>3/15/18</a:t>
+              <a:t>3/18/18</a:t>
             </a:fld>
             <a:endParaRPr lang="en-US"/>
           </a:p>
@@ -4358,10 +4357,10 @@
           <a:lstStyle/>
           <a:p>
             <a:br>
-              <a:rPr lang="en-US" dirty="0"/>
+              <a:rPr lang="en-US"/>
             </a:br>
             <a:r>
-              <a:rPr lang="en-US" sz="4400" dirty="0">
+              <a:rPr lang="en-US" sz="5500">
                 <a:solidFill>
                   <a:srgbClr val="FF0000"/>
                 </a:solidFill>
@@ -4369,31 +4368,12 @@
               <a:t>Santander</a:t>
             </a:r>
             <a:br>
-              <a:rPr lang="en-US" sz="4400" dirty="0"/>
+              <a:rPr lang="en-US" sz="5500"/>
             </a:br>
             <a:r>
-              <a:rPr lang="en-US" sz="4400" dirty="0"/>
+              <a:rPr lang="en-US" sz="5500"/>
               <a:t>Product Recommendation</a:t>
             </a:r>
-            <a:br>
-              <a:rPr lang="en-US" sz="5500" dirty="0"/>
-            </a:br>
-            <a:r>
-              <a:rPr lang="en-US" sz="2400" dirty="0"/>
-              <a:t>Course: CSYE7200 Big Data Engineering with Scala</a:t>
-            </a:r>
-            <a:br>
-              <a:rPr lang="en-US" sz="2400" dirty="0"/>
-            </a:br>
-            <a:r>
-              <a:rPr lang="en-US" sz="2400" dirty="0"/>
-              <a:t>Professor: Robin </a:t>
-            </a:r>
-            <a:r>
-              <a:rPr lang="en-US" sz="2400" dirty="0" err="1"/>
-              <a:t>HilLyard</a:t>
-            </a:r>
-            <a:endParaRPr lang="en-US" sz="2400" dirty="0"/>
           </a:p>
         </p:txBody>
       </p:sp>
@@ -4541,7 +4521,7 @@
             </a:pPr>
             <a:r>
               <a:rPr lang="en-US" dirty="0"/>
-              <a:t>Recommend New Customer the top-rated products of the bank</a:t>
+              <a:t>Actor – Customer</a:t>
             </a:r>
           </a:p>
           <a:p>
@@ -4550,15 +4530,25 @@
             </a:pPr>
             <a:r>
               <a:rPr lang="en-US" dirty="0"/>
-              <a:t>2.    Predict which products their existing customers will use in the next month based on their past behavior and that of similar customers of the bank</a:t>
-            </a:r>
-            <a:r>
-              <a:rPr lang="en-US" dirty="0">
-                <a:solidFill>
-                  <a:srgbClr val="191B0E"/>
-                </a:solidFill>
-              </a:rPr>
-              <a:t>.</a:t>
+              <a:t>When customer is a new customer [customer for less than 6 months], system will recommend specific banking products to the new customer</a:t>
+            </a:r>
+          </a:p>
+          <a:p>
+            <a:pPr marL="0" indent="0">
+              <a:buNone/>
+            </a:pPr>
+            <a:r>
+              <a:rPr lang="en-US" dirty="0"/>
+              <a:t>2.    Actor - Customer</a:t>
+            </a:r>
+          </a:p>
+          <a:p>
+            <a:pPr marL="0" indent="0">
+              <a:buNone/>
+            </a:pPr>
+            <a:r>
+              <a:rPr lang="en-US" dirty="0"/>
+              <a:t>When customer is an existing customer [customer for more than 6 months], system will recommend the relevant products on the basis of previous months product consumption of a customer</a:t>
             </a:r>
             <a:endParaRPr lang="en-US" dirty="0">
               <a:solidFill>
@@ -5867,7 +5857,7 @@
           <p:nvPr>
             <p:extLst>
               <p:ext uri="{D42A27DB-BD31-4B8C-83A1-F6EECF244321}">
-                <p14:modId xmlns:p14="http://schemas.microsoft.com/office/powerpoint/2010/main" val="1832155719"/>
+                <p14:modId xmlns:p14="http://schemas.microsoft.com/office/powerpoint/2010/main" val="1935985272"/>
               </p:ext>
             </p:extLst>
           </p:nvPr>
@@ -6152,7 +6142,7 @@
                       </a:pPr>
                       <a:r>
                         <a:rPr lang="en-US"/>
-                        <a:t>04/10/2018 - 04/15/2018</a:t>
+                        <a:t>04/10/2018 - 04/18/2018</a:t>
                       </a:r>
                     </a:p>
                   </a:txBody>
@@ -6209,7 +6199,7 @@
                     <a:bodyPr/>
                     <a:lstStyle/>
                     <a:p>
-                      <a:endParaRPr lang="en-US"/>
+                      <a:endParaRPr lang="en-US" dirty="0"/>
                     </a:p>
                   </a:txBody>
                   <a:tcPr/>
@@ -6393,6 +6383,15 @@
             <a:endParaRPr lang="en-US" dirty="0"/>
           </a:p>
           <a:p>
+            <a:r>
+              <a:rPr lang="en-US" dirty="0">
+                <a:hlinkClick r:id="rId3"/>
+              </a:rPr>
+              <a:t>https://gitlab.com/nishantgandhi99/Team_7_Santander_Product_Recommendation</a:t>
+            </a:r>
+            <a:endParaRPr lang="en-US" dirty="0"/>
+          </a:p>
+          <a:p>
             <a:endParaRPr lang="en-US" sz="2400" dirty="0"/>
           </a:p>
           <a:p>
@@ -6457,7 +6456,7 @@
         <p:spPr>
           <a:xfrm>
             <a:off x="1333642" y="95250"/>
-            <a:ext cx="10032460" cy="3262432"/>
+            <a:ext cx="10032460" cy="2985433"/>
           </a:xfrm>
           <a:prstGeom prst="rect">
             <a:avLst/>
@@ -6498,37 +6497,16 @@
             </a:r>
           </a:p>
           <a:p>
+            <a:endParaRPr lang="en-US" dirty="0"/>
+          </a:p>
+          <a:p>
             <a:pPr marL="285750" indent="-285750">
               <a:buFont typeface="Wingdings"/>
               <a:buChar char="§"/>
             </a:pPr>
-            <a:endParaRPr lang="en-US" dirty="0"/>
-          </a:p>
-          <a:p>
-            <a:pPr marL="285750" indent="-285750">
-              <a:buFont typeface="Wingdings"/>
-              <a:buChar char="§"/>
-            </a:pPr>
             <a:r>
               <a:rPr lang="en-US" dirty="0"/>
-              <a:t>Running any unit test case will take approximately less than 5-10sec</a:t>
-            </a:r>
-          </a:p>
-          <a:p>
-            <a:pPr marL="285750" indent="-285750">
-              <a:buFont typeface="Wingdings"/>
-              <a:buChar char="§"/>
-            </a:pPr>
-            <a:endParaRPr lang="en-US" dirty="0"/>
-          </a:p>
-          <a:p>
-            <a:pPr marL="285750" indent="-285750">
-              <a:buFont typeface="Wingdings"/>
-              <a:buChar char="§"/>
-            </a:pPr>
-            <a:r>
-              <a:rPr lang="en-US" dirty="0"/>
-              <a:t>UI efficiency to get any recommendation of a banking product for pre-defined customer will be approx. 5-10sec</a:t>
+              <a:t>UI efficiency to get any recommendation of a banking product for pre-defined customer will be approx. 5-10sec [It means almost 90% customers will receive UI response on recommended products approx. in 5-10 seconds time]</a:t>
             </a:r>
           </a:p>
         </p:txBody>
@@ -6578,7 +6556,7 @@
         <p:spPr>
           <a:xfrm>
             <a:off x="1409700" y="669928"/>
-            <a:ext cx="9810750" cy="5755422"/>
+            <a:ext cx="9810750" cy="5201424"/>
           </a:xfrm>
           <a:prstGeom prst="rect">
             <a:avLst/>
@@ -6623,7 +6601,7 @@
               <a:buFont typeface="Wingdings"/>
               <a:buChar char="§"/>
             </a:pPr>
-            <a:endParaRPr lang="en-US"/>
+            <a:endParaRPr lang="en-US" dirty="0"/>
           </a:p>
           <a:p>
             <a:pPr marL="285750" indent="-285750">
@@ -6653,6 +6631,19 @@
             </a:r>
           </a:p>
           <a:p>
+            <a:endParaRPr lang="en-US" dirty="0"/>
+          </a:p>
+          <a:p>
+            <a:pPr marL="285750" indent="-285750">
+              <a:buFont typeface="Wingdings"/>
+              <a:buChar char="§"/>
+            </a:pPr>
+            <a:r>
+              <a:rPr lang="en-US" dirty="0"/>
+              <a:t>Collaborative learning and knowledge sharing, to have good team work</a:t>
+            </a:r>
+          </a:p>
+          <a:p>
             <a:pPr marL="285750" indent="-285750">
               <a:buFont typeface="Wingdings"/>
               <a:buChar char="§"/>
@@ -6666,7 +6657,7 @@
             </a:pPr>
             <a:r>
               <a:rPr lang="en-US" dirty="0"/>
-              <a:t>Deliver project on time without failure</a:t>
+              <a:t>Sharpen presentation skills in a group</a:t>
             </a:r>
           </a:p>
           <a:p>
@@ -6678,35 +6669,8 @@
           </a:p>
           <a:p>
             <a:pPr marL="285750" indent="-285750">
-              <a:buFont typeface="Wingdings"/>
-              <a:buChar char="§"/>
-            </a:pPr>
-            <a:r>
-              <a:rPr lang="en-US" dirty="0"/>
-              <a:t>Collaborative learning and knowledge sharing, to have good team work</a:t>
-            </a:r>
-          </a:p>
-          <a:p>
-            <a:pPr marL="285750" indent="-285750">
-              <a:buFont typeface="Wingdings"/>
-              <a:buChar char="§"/>
-            </a:pPr>
-            <a:endParaRPr lang="en-US" dirty="0"/>
-          </a:p>
-          <a:p>
-            <a:pPr marL="285750" indent="-285750">
-              <a:buFont typeface="Wingdings"/>
-              <a:buChar char="§"/>
-            </a:pPr>
-            <a:r>
-              <a:rPr lang="en-US" dirty="0"/>
-              <a:t>Sharpen presentation skills in a group</a:t>
-            </a:r>
-          </a:p>
-          <a:p>
-            <a:pPr marL="285750" indent="-285750">
-              <a:buFont typeface="Wingdings"/>
-              <a:buChar char="§"/>
+              <a:buFont typeface="Arial"/>
+              <a:buChar char="•"/>
             </a:pPr>
             <a:endParaRPr lang="en-US" dirty="0"/>
           </a:p>
@@ -6718,18 +6682,11 @@
             <a:endParaRPr lang="en-US" dirty="0"/>
           </a:p>
           <a:p>
-            <a:pPr marL="285750" indent="-285750">
-              <a:buFont typeface="Arial"/>
-              <a:buChar char="•"/>
-            </a:pPr>
+            <a:endParaRPr lang="en-US" b="1" dirty="0"/>
+          </a:p>
+          <a:p>
+            <a:pPr algn="ctr"/>
             <a:endParaRPr lang="en-US" dirty="0"/>
-          </a:p>
-          <a:p>
-            <a:endParaRPr lang="en-US" b="1" dirty="0"/>
-          </a:p>
-          <a:p>
-            <a:pPr algn="ctr"/>
-            <a:endParaRPr lang="en-US"/>
           </a:p>
         </p:txBody>
       </p:sp>
@@ -6737,71 +6694,6 @@
     <p:extLst>
       <p:ext uri="{BB962C8B-B14F-4D97-AF65-F5344CB8AC3E}">
         <p14:creationId xmlns:p14="http://schemas.microsoft.com/office/powerpoint/2010/main" val="69147268"/>
-      </p:ext>
-    </p:extLst>
-  </p:cSld>
-  <p:clrMapOvr>
-    <a:masterClrMapping/>
-  </p:clrMapOvr>
-</p:sld>
-</file>
-
-<file path=ppt/slides/slide9.xml><?xml version="1.0" encoding="utf-8"?>
-<p:sld xmlns:a="http://schemas.openxmlformats.org/drawingml/2006/main" xmlns:r="http://schemas.openxmlformats.org/officeDocument/2006/relationships" xmlns:p="http://schemas.openxmlformats.org/presentationml/2006/main">
-  <p:cSld>
-    <p:spTree>
-      <p:nvGrpSpPr>
-        <p:cNvPr id="1" name=""/>
-        <p:cNvGrpSpPr/>
-        <p:nvPr/>
-      </p:nvGrpSpPr>
-      <p:grpSpPr>
-        <a:xfrm>
-          <a:off x="0" y="0"/>
-          <a:ext cx="0" cy="0"/>
-          <a:chOff x="0" y="0"/>
-          <a:chExt cx="0" cy="0"/>
-        </a:xfrm>
-      </p:grpSpPr>
-      <p:sp>
-        <p:nvSpPr>
-          <p:cNvPr id="2" name="TextBox 1">
-            <a:extLst>
-              <a:ext uri="{FF2B5EF4-FFF2-40B4-BE49-F238E27FC236}">
-                <a16:creationId xmlns:a16="http://schemas.microsoft.com/office/drawing/2014/main" id="{09CBC365-F3F2-4340-9914-5A5EEE3EA19D}"/>
-              </a:ext>
-            </a:extLst>
-          </p:cNvPr>
-          <p:cNvSpPr txBox="1"/>
-          <p:nvPr/>
-        </p:nvSpPr>
-        <p:spPr>
-          <a:xfrm>
-            <a:off x="4738255" y="2600696"/>
-            <a:ext cx="3352713" cy="923330"/>
-          </a:xfrm>
-          <a:prstGeom prst="rect">
-            <a:avLst/>
-          </a:prstGeom>
-          <a:noFill/>
-        </p:spPr>
-        <p:txBody>
-          <a:bodyPr wrap="none" rtlCol="0">
-            <a:spAutoFit/>
-          </a:bodyPr>
-          <a:lstStyle/>
-          <a:p>
-            <a:r>
-              <a:rPr lang="en-US" sz="5400" dirty="0"/>
-              <a:t>Thank you!</a:t>
-            </a:r>
-          </a:p>
-        </p:txBody>
-      </p:sp>
-    </p:spTree>
-    <p:extLst>
-      <p:ext uri="{BB962C8B-B14F-4D97-AF65-F5344CB8AC3E}">
-        <p14:creationId xmlns:p14="http://schemas.microsoft.com/office/powerpoint/2010/main" val="2687799551"/>
       </p:ext>
     </p:extLst>
   </p:cSld>

</xml_diff>

<commit_message>
Updated version of project plan presentation V1.1
</commit_message>
<xml_diff>
--- a/Project_Presentation.pptx
+++ b/Project_Presentation.pptx
@@ -122,8 +122,8 @@
 <file path=ppt/revisionInfo.xml><?xml version="1.0" encoding="utf-8"?>
 <p1510:revInfo xmlns:a="http://schemas.openxmlformats.org/drawingml/2006/main" xmlns:r="http://schemas.openxmlformats.org/officeDocument/2006/relationships" xmlns:p1510="http://schemas.microsoft.com/office/powerpoint/2015/10/main">
   <p1510:revLst>
+    <p1510:client id="{59774C1C-9BE2-43E0-A4B7-74DF345FC88F}" v="111" dt="2018-03-12T20:34:03.807"/>
     <p1510:client id="{E715300B-5F82-46A8-982F-D7099BC209F3}" v="44" dt="2018-03-12T20:36:34.329"/>
-    <p1510:client id="{59774C1C-9BE2-43E0-A4B7-74DF345FC88F}" v="111" dt="2018-03-12T20:34:03.807"/>
   </p1510:revLst>
 </p1510:revInfo>
 </file>
@@ -841,7 +841,7 @@
             <a:fld id="{87DE6118-2437-4B30-8E3C-4D2BE6020583}" type="datetimeFigureOut">
               <a:rPr lang="en-US" dirty="0"/>
               <a:pPr/>
-              <a:t>3/18/18</a:t>
+              <a:t>3/19/18</a:t>
             </a:fld>
             <a:endParaRPr lang="en-US"/>
           </a:p>
@@ -1165,7 +1165,7 @@
           <a:p>
             <a:fld id="{87DE6118-2437-4B30-8E3C-4D2BE6020583}" type="datetimeFigureOut">
               <a:rPr lang="en-US" dirty="0"/>
-              <a:t>3/18/18</a:t>
+              <a:t>3/19/18</a:t>
             </a:fld>
             <a:endParaRPr lang="en-US"/>
           </a:p>
@@ -1338,7 +1338,7 @@
           <a:p>
             <a:fld id="{87DE6118-2437-4B30-8E3C-4D2BE6020583}" type="datetimeFigureOut">
               <a:rPr lang="en-US" dirty="0"/>
-              <a:t>3/18/18</a:t>
+              <a:t>3/19/18</a:t>
             </a:fld>
             <a:endParaRPr lang="en-US"/>
           </a:p>
@@ -1501,7 +1501,7 @@
           <a:p>
             <a:fld id="{87DE6118-2437-4B30-8E3C-4D2BE6020583}" type="datetimeFigureOut">
               <a:rPr lang="en-US" dirty="0"/>
-              <a:t>3/18/18</a:t>
+              <a:t>3/19/18</a:t>
             </a:fld>
             <a:endParaRPr lang="en-US"/>
           </a:p>
@@ -1773,7 +1773,7 @@
             <a:fld id="{87DE6118-2437-4B30-8E3C-4D2BE6020583}" type="datetimeFigureOut">
               <a:rPr lang="en-US" dirty="0"/>
               <a:pPr/>
-              <a:t>3/18/18</a:t>
+              <a:t>3/19/18</a:t>
             </a:fld>
             <a:endParaRPr lang="en-US"/>
           </a:p>
@@ -2160,7 +2160,7 @@
           <a:p>
             <a:fld id="{87DE6118-2437-4B30-8E3C-4D2BE6020583}" type="datetimeFigureOut">
               <a:rPr lang="en-US" dirty="0"/>
-              <a:t>3/18/18</a:t>
+              <a:t>3/19/18</a:t>
             </a:fld>
             <a:endParaRPr lang="en-US"/>
           </a:p>
@@ -2629,7 +2629,7 @@
           <a:p>
             <a:fld id="{87DE6118-2437-4B30-8E3C-4D2BE6020583}" type="datetimeFigureOut">
               <a:rPr lang="en-US" dirty="0"/>
-              <a:t>3/18/18</a:t>
+              <a:t>3/19/18</a:t>
             </a:fld>
             <a:endParaRPr lang="en-US"/>
           </a:p>
@@ -2741,7 +2741,7 @@
           <a:p>
             <a:fld id="{87DE6118-2437-4B30-8E3C-4D2BE6020583}" type="datetimeFigureOut">
               <a:rPr lang="en-US" dirty="0"/>
-              <a:t>3/18/18</a:t>
+              <a:t>3/19/18</a:t>
             </a:fld>
             <a:endParaRPr lang="en-US"/>
           </a:p>
@@ -2831,7 +2831,7 @@
           <a:p>
             <a:fld id="{87DE6118-2437-4B30-8E3C-4D2BE6020583}" type="datetimeFigureOut">
               <a:rPr lang="en-US" dirty="0"/>
-              <a:t>3/18/18</a:t>
+              <a:t>3/19/18</a:t>
             </a:fld>
             <a:endParaRPr lang="en-US"/>
           </a:p>
@@ -3171,7 +3171,7 @@
             <a:fld id="{87DE6118-2437-4B30-8E3C-4D2BE6020583}" type="datetimeFigureOut">
               <a:rPr lang="en-US" dirty="0"/>
               <a:pPr/>
-              <a:t>3/18/18</a:t>
+              <a:t>3/19/18</a:t>
             </a:fld>
             <a:endParaRPr lang="en-US"/>
           </a:p>
@@ -3554,7 +3554,7 @@
             <a:fld id="{87DE6118-2437-4B30-8E3C-4D2BE6020583}" type="datetimeFigureOut">
               <a:rPr lang="en-US" dirty="0"/>
               <a:pPr/>
-              <a:t>3/18/18</a:t>
+              <a:t>3/19/18</a:t>
             </a:fld>
             <a:endParaRPr lang="en-US"/>
           </a:p>
@@ -3827,7 +3827,7 @@
             <a:fld id="{87DE6118-2437-4B30-8E3C-4D2BE6020583}" type="datetimeFigureOut">
               <a:rPr lang="en-US" dirty="0"/>
               <a:pPr/>
-              <a:t>3/18/18</a:t>
+              <a:t>3/19/18</a:t>
             </a:fld>
             <a:endParaRPr lang="en-US"/>
           </a:p>
@@ -5857,7 +5857,7 @@
           <p:nvPr>
             <p:extLst>
               <p:ext uri="{D42A27DB-BD31-4B8C-83A1-F6EECF244321}">
-                <p14:modId xmlns:p14="http://schemas.microsoft.com/office/powerpoint/2010/main" val="1935985272"/>
+                <p14:modId xmlns:p14="http://schemas.microsoft.com/office/powerpoint/2010/main" val="3240784630"/>
               </p:ext>
             </p:extLst>
           </p:nvPr>
@@ -6031,8 +6031,8 @@
                         <a:buNone/>
                       </a:pPr>
                       <a:r>
-                        <a:rPr lang="en-US"/>
-                        <a:t>03/26/2018 - 04/02/2018</a:t>
+                        <a:rPr lang="en-US" dirty="0"/>
+                        <a:t>03/26/2018 - 04/01/2018</a:t>
                       </a:r>
                     </a:p>
                   </a:txBody>
@@ -6086,8 +6086,8 @@
                         <a:buNone/>
                       </a:pPr>
                       <a:r>
-                        <a:rPr lang="en-US"/>
-                        <a:t>04/03/2018 - 04/10/2018</a:t>
+                        <a:rPr lang="en-US" dirty="0"/>
+                        <a:t>04/02/2018 - 04/08/2018</a:t>
                       </a:r>
                     </a:p>
                   </a:txBody>
@@ -6141,8 +6141,8 @@
                         <a:buNone/>
                       </a:pPr>
                       <a:r>
-                        <a:rPr lang="en-US"/>
-                        <a:t>04/10/2018 - 04/18/2018</a:t>
+                        <a:rPr lang="en-US" dirty="0"/>
+                        <a:t>04/09/2018 - 04/15/2018</a:t>
                       </a:r>
                     </a:p>
                   </a:txBody>

</xml_diff>